<commit_message>
Oppdatert ppt for trinn 2
</commit_message>
<xml_diff>
--- a/Presentasjoner/Trinn2.pptx
+++ b/Presentasjoner/Trinn2.pptx
@@ -23301,6 +23301,820 @@
   <p:clrMapOvr>
     <a:masterClrMapping/>
   </p:clrMapOvr>
+  <p:timing>
+    <p:tnLst>
+      <p:par>
+        <p:cTn id="1" dur="indefinite" restart="never" nodeType="tmRoot">
+          <p:childTnLst>
+            <p:seq concurrent="1" nextAc="seek">
+              <p:cTn id="2" dur="indefinite" nodeType="mainSeq">
+                <p:childTnLst>
+                  <p:par>
+                    <p:cTn id="3" fill="hold">
+                      <p:stCondLst>
+                        <p:cond delay="indefinite"/>
+                      </p:stCondLst>
+                      <p:childTnLst>
+                        <p:par>
+                          <p:cTn id="4" fill="hold">
+                            <p:stCondLst>
+                              <p:cond delay="0"/>
+                            </p:stCondLst>
+                            <p:childTnLst>
+                              <p:par>
+                                <p:cTn id="5" presetID="1" presetClass="entr" presetSubtype="0" fill="hold" nodeType="clickEffect">
+                                  <p:stCondLst>
+                                    <p:cond delay="0"/>
+                                  </p:stCondLst>
+                                  <p:childTnLst>
+                                    <p:set>
+                                      <p:cBhvr>
+                                        <p:cTn id="6" dur="1" fill="hold">
+                                          <p:stCondLst>
+                                            <p:cond delay="0"/>
+                                          </p:stCondLst>
+                                        </p:cTn>
+                                        <p:tgtEl>
+                                          <p:spTgt spid="3">
+                                            <p:txEl>
+                                              <p:pRg st="0" end="0"/>
+                                            </p:txEl>
+                                          </p:spTgt>
+                                        </p:tgtEl>
+                                        <p:attrNameLst>
+                                          <p:attrName>style.visibility</p:attrName>
+                                        </p:attrNameLst>
+                                      </p:cBhvr>
+                                      <p:to>
+                                        <p:strVal val="visible"/>
+                                      </p:to>
+                                    </p:set>
+                                  </p:childTnLst>
+                                </p:cTn>
+                              </p:par>
+                            </p:childTnLst>
+                          </p:cTn>
+                        </p:par>
+                      </p:childTnLst>
+                    </p:cTn>
+                  </p:par>
+                  <p:par>
+                    <p:cTn id="7" fill="hold">
+                      <p:stCondLst>
+                        <p:cond delay="indefinite"/>
+                      </p:stCondLst>
+                      <p:childTnLst>
+                        <p:par>
+                          <p:cTn id="8" fill="hold">
+                            <p:stCondLst>
+                              <p:cond delay="0"/>
+                            </p:stCondLst>
+                            <p:childTnLst>
+                              <p:par>
+                                <p:cTn id="9" presetID="1" presetClass="entr" presetSubtype="0" fill="hold" nodeType="clickEffect">
+                                  <p:stCondLst>
+                                    <p:cond delay="0"/>
+                                  </p:stCondLst>
+                                  <p:childTnLst>
+                                    <p:set>
+                                      <p:cBhvr>
+                                        <p:cTn id="10" dur="1" fill="hold">
+                                          <p:stCondLst>
+                                            <p:cond delay="0"/>
+                                          </p:stCondLst>
+                                        </p:cTn>
+                                        <p:tgtEl>
+                                          <p:spTgt spid="3">
+                                            <p:txEl>
+                                              <p:pRg st="1" end="1"/>
+                                            </p:txEl>
+                                          </p:spTgt>
+                                        </p:tgtEl>
+                                        <p:attrNameLst>
+                                          <p:attrName>style.visibility</p:attrName>
+                                        </p:attrNameLst>
+                                      </p:cBhvr>
+                                      <p:to>
+                                        <p:strVal val="visible"/>
+                                      </p:to>
+                                    </p:set>
+                                  </p:childTnLst>
+                                </p:cTn>
+                              </p:par>
+                            </p:childTnLst>
+                          </p:cTn>
+                        </p:par>
+                      </p:childTnLst>
+                    </p:cTn>
+                  </p:par>
+                  <p:par>
+                    <p:cTn id="11" fill="hold">
+                      <p:stCondLst>
+                        <p:cond delay="indefinite"/>
+                      </p:stCondLst>
+                      <p:childTnLst>
+                        <p:par>
+                          <p:cTn id="12" fill="hold">
+                            <p:stCondLst>
+                              <p:cond delay="0"/>
+                            </p:stCondLst>
+                            <p:childTnLst>
+                              <p:par>
+                                <p:cTn id="13" presetID="1" presetClass="entr" presetSubtype="0" fill="hold" nodeType="clickEffect">
+                                  <p:stCondLst>
+                                    <p:cond delay="0"/>
+                                  </p:stCondLst>
+                                  <p:childTnLst>
+                                    <p:set>
+                                      <p:cBhvr>
+                                        <p:cTn id="14" dur="1" fill="hold">
+                                          <p:stCondLst>
+                                            <p:cond delay="0"/>
+                                          </p:stCondLst>
+                                        </p:cTn>
+                                        <p:tgtEl>
+                                          <p:spTgt spid="3">
+                                            <p:txEl>
+                                              <p:pRg st="2" end="2"/>
+                                            </p:txEl>
+                                          </p:spTgt>
+                                        </p:tgtEl>
+                                        <p:attrNameLst>
+                                          <p:attrName>style.visibility</p:attrName>
+                                        </p:attrNameLst>
+                                      </p:cBhvr>
+                                      <p:to>
+                                        <p:strVal val="visible"/>
+                                      </p:to>
+                                    </p:set>
+                                  </p:childTnLst>
+                                </p:cTn>
+                              </p:par>
+                            </p:childTnLst>
+                          </p:cTn>
+                        </p:par>
+                      </p:childTnLst>
+                    </p:cTn>
+                  </p:par>
+                  <p:par>
+                    <p:cTn id="15" fill="hold">
+                      <p:stCondLst>
+                        <p:cond delay="indefinite"/>
+                      </p:stCondLst>
+                      <p:childTnLst>
+                        <p:par>
+                          <p:cTn id="16" fill="hold">
+                            <p:stCondLst>
+                              <p:cond delay="0"/>
+                            </p:stCondLst>
+                            <p:childTnLst>
+                              <p:par>
+                                <p:cTn id="17" presetID="1" presetClass="entr" presetSubtype="0" fill="hold" nodeType="clickEffect">
+                                  <p:stCondLst>
+                                    <p:cond delay="0"/>
+                                  </p:stCondLst>
+                                  <p:childTnLst>
+                                    <p:set>
+                                      <p:cBhvr>
+                                        <p:cTn id="18" dur="1" fill="hold">
+                                          <p:stCondLst>
+                                            <p:cond delay="0"/>
+                                          </p:stCondLst>
+                                        </p:cTn>
+                                        <p:tgtEl>
+                                          <p:spTgt spid="3">
+                                            <p:txEl>
+                                              <p:pRg st="3" end="3"/>
+                                            </p:txEl>
+                                          </p:spTgt>
+                                        </p:tgtEl>
+                                        <p:attrNameLst>
+                                          <p:attrName>style.visibility</p:attrName>
+                                        </p:attrNameLst>
+                                      </p:cBhvr>
+                                      <p:to>
+                                        <p:strVal val="visible"/>
+                                      </p:to>
+                                    </p:set>
+                                  </p:childTnLst>
+                                </p:cTn>
+                              </p:par>
+                            </p:childTnLst>
+                          </p:cTn>
+                        </p:par>
+                      </p:childTnLst>
+                    </p:cTn>
+                  </p:par>
+                  <p:par>
+                    <p:cTn id="19" fill="hold">
+                      <p:stCondLst>
+                        <p:cond delay="indefinite"/>
+                      </p:stCondLst>
+                      <p:childTnLst>
+                        <p:par>
+                          <p:cTn id="20" fill="hold">
+                            <p:stCondLst>
+                              <p:cond delay="0"/>
+                            </p:stCondLst>
+                            <p:childTnLst>
+                              <p:par>
+                                <p:cTn id="21" presetID="1" presetClass="entr" presetSubtype="0" fill="hold" nodeType="clickEffect">
+                                  <p:stCondLst>
+                                    <p:cond delay="0"/>
+                                  </p:stCondLst>
+                                  <p:childTnLst>
+                                    <p:set>
+                                      <p:cBhvr>
+                                        <p:cTn id="22" dur="1" fill="hold">
+                                          <p:stCondLst>
+                                            <p:cond delay="0"/>
+                                          </p:stCondLst>
+                                        </p:cTn>
+                                        <p:tgtEl>
+                                          <p:spTgt spid="3">
+                                            <p:txEl>
+                                              <p:pRg st="4" end="4"/>
+                                            </p:txEl>
+                                          </p:spTgt>
+                                        </p:tgtEl>
+                                        <p:attrNameLst>
+                                          <p:attrName>style.visibility</p:attrName>
+                                        </p:attrNameLst>
+                                      </p:cBhvr>
+                                      <p:to>
+                                        <p:strVal val="visible"/>
+                                      </p:to>
+                                    </p:set>
+                                  </p:childTnLst>
+                                </p:cTn>
+                              </p:par>
+                            </p:childTnLst>
+                          </p:cTn>
+                        </p:par>
+                      </p:childTnLst>
+                    </p:cTn>
+                  </p:par>
+                  <p:par>
+                    <p:cTn id="23" fill="hold">
+                      <p:stCondLst>
+                        <p:cond delay="indefinite"/>
+                      </p:stCondLst>
+                      <p:childTnLst>
+                        <p:par>
+                          <p:cTn id="24" fill="hold">
+                            <p:stCondLst>
+                              <p:cond delay="0"/>
+                            </p:stCondLst>
+                            <p:childTnLst>
+                              <p:par>
+                                <p:cTn id="25" presetID="1" presetClass="entr" presetSubtype="0" fill="hold" nodeType="clickEffect">
+                                  <p:stCondLst>
+                                    <p:cond delay="0"/>
+                                  </p:stCondLst>
+                                  <p:childTnLst>
+                                    <p:set>
+                                      <p:cBhvr>
+                                        <p:cTn id="26" dur="1" fill="hold">
+                                          <p:stCondLst>
+                                            <p:cond delay="0"/>
+                                          </p:stCondLst>
+                                        </p:cTn>
+                                        <p:tgtEl>
+                                          <p:spTgt spid="3">
+                                            <p:txEl>
+                                              <p:pRg st="5" end="5"/>
+                                            </p:txEl>
+                                          </p:spTgt>
+                                        </p:tgtEl>
+                                        <p:attrNameLst>
+                                          <p:attrName>style.visibility</p:attrName>
+                                        </p:attrNameLst>
+                                      </p:cBhvr>
+                                      <p:to>
+                                        <p:strVal val="visible"/>
+                                      </p:to>
+                                    </p:set>
+                                  </p:childTnLst>
+                                </p:cTn>
+                              </p:par>
+                            </p:childTnLst>
+                          </p:cTn>
+                        </p:par>
+                      </p:childTnLst>
+                    </p:cTn>
+                  </p:par>
+                  <p:par>
+                    <p:cTn id="27" fill="hold">
+                      <p:stCondLst>
+                        <p:cond delay="indefinite"/>
+                      </p:stCondLst>
+                      <p:childTnLst>
+                        <p:par>
+                          <p:cTn id="28" fill="hold">
+                            <p:stCondLst>
+                              <p:cond delay="0"/>
+                            </p:stCondLst>
+                            <p:childTnLst>
+                              <p:par>
+                                <p:cTn id="29" presetID="1" presetClass="entr" presetSubtype="0" fill="hold" nodeType="clickEffect">
+                                  <p:stCondLst>
+                                    <p:cond delay="0"/>
+                                  </p:stCondLst>
+                                  <p:childTnLst>
+                                    <p:set>
+                                      <p:cBhvr>
+                                        <p:cTn id="30" dur="1" fill="hold">
+                                          <p:stCondLst>
+                                            <p:cond delay="0"/>
+                                          </p:stCondLst>
+                                        </p:cTn>
+                                        <p:tgtEl>
+                                          <p:spTgt spid="3">
+                                            <p:txEl>
+                                              <p:pRg st="6" end="6"/>
+                                            </p:txEl>
+                                          </p:spTgt>
+                                        </p:tgtEl>
+                                        <p:attrNameLst>
+                                          <p:attrName>style.visibility</p:attrName>
+                                        </p:attrNameLst>
+                                      </p:cBhvr>
+                                      <p:to>
+                                        <p:strVal val="visible"/>
+                                      </p:to>
+                                    </p:set>
+                                  </p:childTnLst>
+                                </p:cTn>
+                              </p:par>
+                            </p:childTnLst>
+                          </p:cTn>
+                        </p:par>
+                      </p:childTnLst>
+                    </p:cTn>
+                  </p:par>
+                  <p:par>
+                    <p:cTn id="31" fill="hold">
+                      <p:stCondLst>
+                        <p:cond delay="indefinite"/>
+                      </p:stCondLst>
+                      <p:childTnLst>
+                        <p:par>
+                          <p:cTn id="32" fill="hold">
+                            <p:stCondLst>
+                              <p:cond delay="0"/>
+                            </p:stCondLst>
+                            <p:childTnLst>
+                              <p:par>
+                                <p:cTn id="33" presetID="1" presetClass="entr" presetSubtype="0" fill="hold" nodeType="clickEffect">
+                                  <p:stCondLst>
+                                    <p:cond delay="0"/>
+                                  </p:stCondLst>
+                                  <p:childTnLst>
+                                    <p:set>
+                                      <p:cBhvr>
+                                        <p:cTn id="34" dur="1" fill="hold">
+                                          <p:stCondLst>
+                                            <p:cond delay="0"/>
+                                          </p:stCondLst>
+                                        </p:cTn>
+                                        <p:tgtEl>
+                                          <p:spTgt spid="3">
+                                            <p:txEl>
+                                              <p:pRg st="7" end="7"/>
+                                            </p:txEl>
+                                          </p:spTgt>
+                                        </p:tgtEl>
+                                        <p:attrNameLst>
+                                          <p:attrName>style.visibility</p:attrName>
+                                        </p:attrNameLst>
+                                      </p:cBhvr>
+                                      <p:to>
+                                        <p:strVal val="visible"/>
+                                      </p:to>
+                                    </p:set>
+                                  </p:childTnLst>
+                                </p:cTn>
+                              </p:par>
+                            </p:childTnLst>
+                          </p:cTn>
+                        </p:par>
+                      </p:childTnLst>
+                    </p:cTn>
+                  </p:par>
+                  <p:par>
+                    <p:cTn id="35" fill="hold">
+                      <p:stCondLst>
+                        <p:cond delay="indefinite"/>
+                      </p:stCondLst>
+                      <p:childTnLst>
+                        <p:par>
+                          <p:cTn id="36" fill="hold">
+                            <p:stCondLst>
+                              <p:cond delay="0"/>
+                            </p:stCondLst>
+                            <p:childTnLst>
+                              <p:par>
+                                <p:cTn id="37" presetID="1" presetClass="entr" presetSubtype="0" fill="hold" nodeType="clickEffect">
+                                  <p:stCondLst>
+                                    <p:cond delay="0"/>
+                                  </p:stCondLst>
+                                  <p:childTnLst>
+                                    <p:set>
+                                      <p:cBhvr>
+                                        <p:cTn id="38" dur="1" fill="hold">
+                                          <p:stCondLst>
+                                            <p:cond delay="0"/>
+                                          </p:stCondLst>
+                                        </p:cTn>
+                                        <p:tgtEl>
+                                          <p:spTgt spid="4">
+                                            <p:txEl>
+                                              <p:pRg st="0" end="0"/>
+                                            </p:txEl>
+                                          </p:spTgt>
+                                        </p:tgtEl>
+                                        <p:attrNameLst>
+                                          <p:attrName>style.visibility</p:attrName>
+                                        </p:attrNameLst>
+                                      </p:cBhvr>
+                                      <p:to>
+                                        <p:strVal val="visible"/>
+                                      </p:to>
+                                    </p:set>
+                                  </p:childTnLst>
+                                </p:cTn>
+                              </p:par>
+                            </p:childTnLst>
+                          </p:cTn>
+                        </p:par>
+                      </p:childTnLst>
+                    </p:cTn>
+                  </p:par>
+                  <p:par>
+                    <p:cTn id="39" fill="hold">
+                      <p:stCondLst>
+                        <p:cond delay="indefinite"/>
+                      </p:stCondLst>
+                      <p:childTnLst>
+                        <p:par>
+                          <p:cTn id="40" fill="hold">
+                            <p:stCondLst>
+                              <p:cond delay="0"/>
+                            </p:stCondLst>
+                            <p:childTnLst>
+                              <p:par>
+                                <p:cTn id="41" presetID="1" presetClass="entr" presetSubtype="0" fill="hold" nodeType="clickEffect">
+                                  <p:stCondLst>
+                                    <p:cond delay="0"/>
+                                  </p:stCondLst>
+                                  <p:childTnLst>
+                                    <p:set>
+                                      <p:cBhvr>
+                                        <p:cTn id="42" dur="1" fill="hold">
+                                          <p:stCondLst>
+                                            <p:cond delay="0"/>
+                                          </p:stCondLst>
+                                        </p:cTn>
+                                        <p:tgtEl>
+                                          <p:spTgt spid="4">
+                                            <p:txEl>
+                                              <p:pRg st="1" end="1"/>
+                                            </p:txEl>
+                                          </p:spTgt>
+                                        </p:tgtEl>
+                                        <p:attrNameLst>
+                                          <p:attrName>style.visibility</p:attrName>
+                                        </p:attrNameLst>
+                                      </p:cBhvr>
+                                      <p:to>
+                                        <p:strVal val="visible"/>
+                                      </p:to>
+                                    </p:set>
+                                  </p:childTnLst>
+                                </p:cTn>
+                              </p:par>
+                            </p:childTnLst>
+                          </p:cTn>
+                        </p:par>
+                      </p:childTnLst>
+                    </p:cTn>
+                  </p:par>
+                  <p:par>
+                    <p:cTn id="43" fill="hold">
+                      <p:stCondLst>
+                        <p:cond delay="indefinite"/>
+                      </p:stCondLst>
+                      <p:childTnLst>
+                        <p:par>
+                          <p:cTn id="44" fill="hold">
+                            <p:stCondLst>
+                              <p:cond delay="0"/>
+                            </p:stCondLst>
+                            <p:childTnLst>
+                              <p:par>
+                                <p:cTn id="45" presetID="1" presetClass="entr" presetSubtype="0" fill="hold" nodeType="clickEffect">
+                                  <p:stCondLst>
+                                    <p:cond delay="0"/>
+                                  </p:stCondLst>
+                                  <p:childTnLst>
+                                    <p:set>
+                                      <p:cBhvr>
+                                        <p:cTn id="46" dur="1" fill="hold">
+                                          <p:stCondLst>
+                                            <p:cond delay="0"/>
+                                          </p:stCondLst>
+                                        </p:cTn>
+                                        <p:tgtEl>
+                                          <p:spTgt spid="4">
+                                            <p:txEl>
+                                              <p:pRg st="2" end="2"/>
+                                            </p:txEl>
+                                          </p:spTgt>
+                                        </p:tgtEl>
+                                        <p:attrNameLst>
+                                          <p:attrName>style.visibility</p:attrName>
+                                        </p:attrNameLst>
+                                      </p:cBhvr>
+                                      <p:to>
+                                        <p:strVal val="visible"/>
+                                      </p:to>
+                                    </p:set>
+                                  </p:childTnLst>
+                                </p:cTn>
+                              </p:par>
+                            </p:childTnLst>
+                          </p:cTn>
+                        </p:par>
+                      </p:childTnLst>
+                    </p:cTn>
+                  </p:par>
+                  <p:par>
+                    <p:cTn id="47" fill="hold">
+                      <p:stCondLst>
+                        <p:cond delay="indefinite"/>
+                      </p:stCondLst>
+                      <p:childTnLst>
+                        <p:par>
+                          <p:cTn id="48" fill="hold">
+                            <p:stCondLst>
+                              <p:cond delay="0"/>
+                            </p:stCondLst>
+                            <p:childTnLst>
+                              <p:par>
+                                <p:cTn id="49" presetID="1" presetClass="entr" presetSubtype="0" fill="hold" nodeType="clickEffect">
+                                  <p:stCondLst>
+                                    <p:cond delay="0"/>
+                                  </p:stCondLst>
+                                  <p:childTnLst>
+                                    <p:set>
+                                      <p:cBhvr>
+                                        <p:cTn id="50" dur="1" fill="hold">
+                                          <p:stCondLst>
+                                            <p:cond delay="0"/>
+                                          </p:stCondLst>
+                                        </p:cTn>
+                                        <p:tgtEl>
+                                          <p:spTgt spid="4">
+                                            <p:txEl>
+                                              <p:pRg st="3" end="3"/>
+                                            </p:txEl>
+                                          </p:spTgt>
+                                        </p:tgtEl>
+                                        <p:attrNameLst>
+                                          <p:attrName>style.visibility</p:attrName>
+                                        </p:attrNameLst>
+                                      </p:cBhvr>
+                                      <p:to>
+                                        <p:strVal val="visible"/>
+                                      </p:to>
+                                    </p:set>
+                                  </p:childTnLst>
+                                </p:cTn>
+                              </p:par>
+                            </p:childTnLst>
+                          </p:cTn>
+                        </p:par>
+                      </p:childTnLst>
+                    </p:cTn>
+                  </p:par>
+                  <p:par>
+                    <p:cTn id="51" fill="hold">
+                      <p:stCondLst>
+                        <p:cond delay="indefinite"/>
+                      </p:stCondLst>
+                      <p:childTnLst>
+                        <p:par>
+                          <p:cTn id="52" fill="hold">
+                            <p:stCondLst>
+                              <p:cond delay="0"/>
+                            </p:stCondLst>
+                            <p:childTnLst>
+                              <p:par>
+                                <p:cTn id="53" presetID="1" presetClass="entr" presetSubtype="0" fill="hold" nodeType="clickEffect">
+                                  <p:stCondLst>
+                                    <p:cond delay="0"/>
+                                  </p:stCondLst>
+                                  <p:childTnLst>
+                                    <p:set>
+                                      <p:cBhvr>
+                                        <p:cTn id="54" dur="1" fill="hold">
+                                          <p:stCondLst>
+                                            <p:cond delay="0"/>
+                                          </p:stCondLst>
+                                        </p:cTn>
+                                        <p:tgtEl>
+                                          <p:spTgt spid="4">
+                                            <p:txEl>
+                                              <p:pRg st="4" end="4"/>
+                                            </p:txEl>
+                                          </p:spTgt>
+                                        </p:tgtEl>
+                                        <p:attrNameLst>
+                                          <p:attrName>style.visibility</p:attrName>
+                                        </p:attrNameLst>
+                                      </p:cBhvr>
+                                      <p:to>
+                                        <p:strVal val="visible"/>
+                                      </p:to>
+                                    </p:set>
+                                  </p:childTnLst>
+                                </p:cTn>
+                              </p:par>
+                            </p:childTnLst>
+                          </p:cTn>
+                        </p:par>
+                      </p:childTnLst>
+                    </p:cTn>
+                  </p:par>
+                  <p:par>
+                    <p:cTn id="55" fill="hold">
+                      <p:stCondLst>
+                        <p:cond delay="indefinite"/>
+                      </p:stCondLst>
+                      <p:childTnLst>
+                        <p:par>
+                          <p:cTn id="56" fill="hold">
+                            <p:stCondLst>
+                              <p:cond delay="0"/>
+                            </p:stCondLst>
+                            <p:childTnLst>
+                              <p:par>
+                                <p:cTn id="57" presetID="1" presetClass="entr" presetSubtype="0" fill="hold" nodeType="clickEffect">
+                                  <p:stCondLst>
+                                    <p:cond delay="0"/>
+                                  </p:stCondLst>
+                                  <p:childTnLst>
+                                    <p:set>
+                                      <p:cBhvr>
+                                        <p:cTn id="58" dur="1" fill="hold">
+                                          <p:stCondLst>
+                                            <p:cond delay="0"/>
+                                          </p:stCondLst>
+                                        </p:cTn>
+                                        <p:tgtEl>
+                                          <p:spTgt spid="4">
+                                            <p:txEl>
+                                              <p:pRg st="5" end="5"/>
+                                            </p:txEl>
+                                          </p:spTgt>
+                                        </p:tgtEl>
+                                        <p:attrNameLst>
+                                          <p:attrName>style.visibility</p:attrName>
+                                        </p:attrNameLst>
+                                      </p:cBhvr>
+                                      <p:to>
+                                        <p:strVal val="visible"/>
+                                      </p:to>
+                                    </p:set>
+                                  </p:childTnLst>
+                                </p:cTn>
+                              </p:par>
+                            </p:childTnLst>
+                          </p:cTn>
+                        </p:par>
+                      </p:childTnLst>
+                    </p:cTn>
+                  </p:par>
+                  <p:par>
+                    <p:cTn id="59" fill="hold">
+                      <p:stCondLst>
+                        <p:cond delay="indefinite"/>
+                      </p:stCondLst>
+                      <p:childTnLst>
+                        <p:par>
+                          <p:cTn id="60" fill="hold">
+                            <p:stCondLst>
+                              <p:cond delay="0"/>
+                            </p:stCondLst>
+                            <p:childTnLst>
+                              <p:par>
+                                <p:cTn id="61" presetID="1" presetClass="entr" presetSubtype="0" fill="hold" nodeType="clickEffect">
+                                  <p:stCondLst>
+                                    <p:cond delay="0"/>
+                                  </p:stCondLst>
+                                  <p:childTnLst>
+                                    <p:set>
+                                      <p:cBhvr>
+                                        <p:cTn id="62" dur="1" fill="hold">
+                                          <p:stCondLst>
+                                            <p:cond delay="0"/>
+                                          </p:stCondLst>
+                                        </p:cTn>
+                                        <p:tgtEl>
+                                          <p:spTgt spid="4">
+                                            <p:txEl>
+                                              <p:pRg st="6" end="6"/>
+                                            </p:txEl>
+                                          </p:spTgt>
+                                        </p:tgtEl>
+                                        <p:attrNameLst>
+                                          <p:attrName>style.visibility</p:attrName>
+                                        </p:attrNameLst>
+                                      </p:cBhvr>
+                                      <p:to>
+                                        <p:strVal val="visible"/>
+                                      </p:to>
+                                    </p:set>
+                                  </p:childTnLst>
+                                </p:cTn>
+                              </p:par>
+                            </p:childTnLst>
+                          </p:cTn>
+                        </p:par>
+                      </p:childTnLst>
+                    </p:cTn>
+                  </p:par>
+                  <p:par>
+                    <p:cTn id="63" fill="hold">
+                      <p:stCondLst>
+                        <p:cond delay="indefinite"/>
+                      </p:stCondLst>
+                      <p:childTnLst>
+                        <p:par>
+                          <p:cTn id="64" fill="hold">
+                            <p:stCondLst>
+                              <p:cond delay="0"/>
+                            </p:stCondLst>
+                            <p:childTnLst>
+                              <p:par>
+                                <p:cTn id="65" presetID="1" presetClass="entr" presetSubtype="0" fill="hold" nodeType="clickEffect">
+                                  <p:stCondLst>
+                                    <p:cond delay="0"/>
+                                  </p:stCondLst>
+                                  <p:childTnLst>
+                                    <p:set>
+                                      <p:cBhvr>
+                                        <p:cTn id="66" dur="1" fill="hold">
+                                          <p:stCondLst>
+                                            <p:cond delay="0"/>
+                                          </p:stCondLst>
+                                        </p:cTn>
+                                        <p:tgtEl>
+                                          <p:spTgt spid="4">
+                                            <p:txEl>
+                                              <p:pRg st="7" end="7"/>
+                                            </p:txEl>
+                                          </p:spTgt>
+                                        </p:tgtEl>
+                                        <p:attrNameLst>
+                                          <p:attrName>style.visibility</p:attrName>
+                                        </p:attrNameLst>
+                                      </p:cBhvr>
+                                      <p:to>
+                                        <p:strVal val="visible"/>
+                                      </p:to>
+                                    </p:set>
+                                  </p:childTnLst>
+                                </p:cTn>
+                              </p:par>
+                            </p:childTnLst>
+                          </p:cTn>
+                        </p:par>
+                      </p:childTnLst>
+                    </p:cTn>
+                  </p:par>
+                </p:childTnLst>
+              </p:cTn>
+              <p:prevCondLst>
+                <p:cond evt="onPrev" delay="0">
+                  <p:tgtEl>
+                    <p:sldTgt/>
+                  </p:tgtEl>
+                </p:cond>
+              </p:prevCondLst>
+              <p:nextCondLst>
+                <p:cond evt="onNext" delay="0">
+                  <p:tgtEl>
+                    <p:sldTgt/>
+                  </p:tgtEl>
+                </p:cond>
+              </p:nextCondLst>
+            </p:seq>
+          </p:childTnLst>
+        </p:cTn>
+      </p:par>
+    </p:tnLst>
+  </p:timing>
 </p:sld>
 </file>
 
@@ -26753,7 +27567,15 @@
             </a:r>
             <a:r>
               <a:rPr lang="nn-NO" dirty="0"/>
-              <a:t>siste </a:t>
+              <a:t>siste/</a:t>
+            </a:r>
+            <a:r>
+              <a:rPr lang="nn-NO" dirty="0" err="1"/>
+              <a:t>øverste</a:t>
+            </a:r>
+            <a:r>
+              <a:rPr lang="nn-NO" dirty="0"/>
+              <a:t> </a:t>
             </a:r>
             <a:r>
               <a:rPr lang="nn-NO" dirty="0" err="1"/>
@@ -27211,6 +28033,231 @@
   <p:clrMapOvr>
     <a:masterClrMapping/>
   </p:clrMapOvr>
+  <p:timing>
+    <p:tnLst>
+      <p:par>
+        <p:cTn id="1" dur="indefinite" restart="never" nodeType="tmRoot">
+          <p:childTnLst>
+            <p:seq concurrent="1" nextAc="seek">
+              <p:cTn id="2" dur="indefinite" nodeType="mainSeq">
+                <p:childTnLst>
+                  <p:par>
+                    <p:cTn id="3" fill="hold">
+                      <p:stCondLst>
+                        <p:cond delay="indefinite"/>
+                      </p:stCondLst>
+                      <p:childTnLst>
+                        <p:par>
+                          <p:cTn id="4" fill="hold">
+                            <p:stCondLst>
+                              <p:cond delay="0"/>
+                            </p:stCondLst>
+                            <p:childTnLst>
+                              <p:par>
+                                <p:cTn id="5" presetID="1" presetClass="entr" presetSubtype="0" fill="hold" nodeType="clickEffect">
+                                  <p:stCondLst>
+                                    <p:cond delay="0"/>
+                                  </p:stCondLst>
+                                  <p:childTnLst>
+                                    <p:set>
+                                      <p:cBhvr>
+                                        <p:cTn id="6" dur="1" fill="hold">
+                                          <p:stCondLst>
+                                            <p:cond delay="0"/>
+                                          </p:stCondLst>
+                                        </p:cTn>
+                                        <p:tgtEl>
+                                          <p:spTgt spid="4">
+                                            <p:txEl>
+                                              <p:pRg st="0" end="0"/>
+                                            </p:txEl>
+                                          </p:spTgt>
+                                        </p:tgtEl>
+                                        <p:attrNameLst>
+                                          <p:attrName>style.visibility</p:attrName>
+                                        </p:attrNameLst>
+                                      </p:cBhvr>
+                                      <p:to>
+                                        <p:strVal val="visible"/>
+                                      </p:to>
+                                    </p:set>
+                                  </p:childTnLst>
+                                </p:cTn>
+                              </p:par>
+                            </p:childTnLst>
+                          </p:cTn>
+                        </p:par>
+                      </p:childTnLst>
+                    </p:cTn>
+                  </p:par>
+                  <p:par>
+                    <p:cTn id="7" fill="hold">
+                      <p:stCondLst>
+                        <p:cond delay="indefinite"/>
+                      </p:stCondLst>
+                      <p:childTnLst>
+                        <p:par>
+                          <p:cTn id="8" fill="hold">
+                            <p:stCondLst>
+                              <p:cond delay="0"/>
+                            </p:stCondLst>
+                            <p:childTnLst>
+                              <p:par>
+                                <p:cTn id="9" presetID="1" presetClass="entr" presetSubtype="0" fill="hold" nodeType="clickEffect">
+                                  <p:stCondLst>
+                                    <p:cond delay="0"/>
+                                  </p:stCondLst>
+                                  <p:childTnLst>
+                                    <p:set>
+                                      <p:cBhvr>
+                                        <p:cTn id="10" dur="1" fill="hold">
+                                          <p:stCondLst>
+                                            <p:cond delay="0"/>
+                                          </p:stCondLst>
+                                        </p:cTn>
+                                        <p:tgtEl>
+                                          <p:spTgt spid="4">
+                                            <p:txEl>
+                                              <p:pRg st="1" end="1"/>
+                                            </p:txEl>
+                                          </p:spTgt>
+                                        </p:tgtEl>
+                                        <p:attrNameLst>
+                                          <p:attrName>style.visibility</p:attrName>
+                                        </p:attrNameLst>
+                                      </p:cBhvr>
+                                      <p:to>
+                                        <p:strVal val="visible"/>
+                                      </p:to>
+                                    </p:set>
+                                  </p:childTnLst>
+                                </p:cTn>
+                              </p:par>
+                            </p:childTnLst>
+                          </p:cTn>
+                        </p:par>
+                      </p:childTnLst>
+                    </p:cTn>
+                  </p:par>
+                  <p:par>
+                    <p:cTn id="11" fill="hold">
+                      <p:stCondLst>
+                        <p:cond delay="indefinite"/>
+                      </p:stCondLst>
+                      <p:childTnLst>
+                        <p:par>
+                          <p:cTn id="12" fill="hold">
+                            <p:stCondLst>
+                              <p:cond delay="0"/>
+                            </p:stCondLst>
+                            <p:childTnLst>
+                              <p:par>
+                                <p:cTn id="13" presetID="1" presetClass="entr" presetSubtype="0" fill="hold" nodeType="clickEffect">
+                                  <p:stCondLst>
+                                    <p:cond delay="0"/>
+                                  </p:stCondLst>
+                                  <p:childTnLst>
+                                    <p:set>
+                                      <p:cBhvr>
+                                        <p:cTn id="14" dur="1" fill="hold">
+                                          <p:stCondLst>
+                                            <p:cond delay="0"/>
+                                          </p:stCondLst>
+                                        </p:cTn>
+                                        <p:tgtEl>
+                                          <p:spTgt spid="4">
+                                            <p:txEl>
+                                              <p:pRg st="2" end="2"/>
+                                            </p:txEl>
+                                          </p:spTgt>
+                                        </p:tgtEl>
+                                        <p:attrNameLst>
+                                          <p:attrName>style.visibility</p:attrName>
+                                        </p:attrNameLst>
+                                      </p:cBhvr>
+                                      <p:to>
+                                        <p:strVal val="visible"/>
+                                      </p:to>
+                                    </p:set>
+                                  </p:childTnLst>
+                                </p:cTn>
+                              </p:par>
+                            </p:childTnLst>
+                          </p:cTn>
+                        </p:par>
+                      </p:childTnLst>
+                    </p:cTn>
+                  </p:par>
+                  <p:par>
+                    <p:cTn id="15" fill="hold">
+                      <p:stCondLst>
+                        <p:cond delay="indefinite"/>
+                      </p:stCondLst>
+                      <p:childTnLst>
+                        <p:par>
+                          <p:cTn id="16" fill="hold">
+                            <p:stCondLst>
+                              <p:cond delay="0"/>
+                            </p:stCondLst>
+                            <p:childTnLst>
+                              <p:par>
+                                <p:cTn id="17" presetID="1" presetClass="entr" presetSubtype="0" fill="hold" grpId="0" nodeType="clickEffect">
+                                  <p:stCondLst>
+                                    <p:cond delay="0"/>
+                                  </p:stCondLst>
+                                  <p:childTnLst>
+                                    <p:set>
+                                      <p:cBhvr>
+                                        <p:cTn id="18" dur="1" fill="hold">
+                                          <p:stCondLst>
+                                            <p:cond delay="0"/>
+                                          </p:stCondLst>
+                                        </p:cTn>
+                                        <p:tgtEl>
+                                          <p:spTgt spid="6"/>
+                                        </p:tgtEl>
+                                        <p:attrNameLst>
+                                          <p:attrName>style.visibility</p:attrName>
+                                        </p:attrNameLst>
+                                      </p:cBhvr>
+                                      <p:to>
+                                        <p:strVal val="visible"/>
+                                      </p:to>
+                                    </p:set>
+                                  </p:childTnLst>
+                                </p:cTn>
+                              </p:par>
+                            </p:childTnLst>
+                          </p:cTn>
+                        </p:par>
+                      </p:childTnLst>
+                    </p:cTn>
+                  </p:par>
+                </p:childTnLst>
+              </p:cTn>
+              <p:prevCondLst>
+                <p:cond evt="onPrev" delay="0">
+                  <p:tgtEl>
+                    <p:sldTgt/>
+                  </p:tgtEl>
+                </p:cond>
+              </p:prevCondLst>
+              <p:nextCondLst>
+                <p:cond evt="onNext" delay="0">
+                  <p:tgtEl>
+                    <p:sldTgt/>
+                  </p:tgtEl>
+                </p:cond>
+              </p:nextCondLst>
+            </p:seq>
+          </p:childTnLst>
+        </p:cTn>
+      </p:par>
+    </p:tnLst>
+    <p:bldLst>
+      <p:bldP spid="6" grpId="0"/>
+    </p:bldLst>
+  </p:timing>
 </p:sld>
 </file>
 
@@ -29388,6 +30435,51 @@
                       </p:childTnLst>
                     </p:cTn>
                   </p:par>
+                  <p:par>
+                    <p:cTn id="31" fill="hold">
+                      <p:stCondLst>
+                        <p:cond delay="indefinite"/>
+                      </p:stCondLst>
+                      <p:childTnLst>
+                        <p:par>
+                          <p:cTn id="32" fill="hold">
+                            <p:stCondLst>
+                              <p:cond delay="0"/>
+                            </p:stCondLst>
+                            <p:childTnLst>
+                              <p:par>
+                                <p:cTn id="33" presetID="1" presetClass="entr" presetSubtype="0" fill="hold" grpId="0" nodeType="clickEffect">
+                                  <p:stCondLst>
+                                    <p:cond delay="0"/>
+                                  </p:stCondLst>
+                                  <p:childTnLst>
+                                    <p:set>
+                                      <p:cBhvr>
+                                        <p:cTn id="34" dur="1" fill="hold">
+                                          <p:stCondLst>
+                                            <p:cond delay="0"/>
+                                          </p:stCondLst>
+                                        </p:cTn>
+                                        <p:tgtEl>
+                                          <p:spTgt spid="6"/>
+                                        </p:tgtEl>
+                                        <p:attrNameLst>
+                                          <p:attrName>style.visibility</p:attrName>
+                                        </p:attrNameLst>
+                                      </p:cBhvr>
+                                      <p:to>
+                                        <p:strVal val="visible"/>
+                                      </p:to>
+                                    </p:set>
+                                  </p:childTnLst>
+                                </p:cTn>
+                              </p:par>
+                            </p:childTnLst>
+                          </p:cTn>
+                        </p:par>
+                      </p:childTnLst>
+                    </p:cTn>
+                  </p:par>
                 </p:childTnLst>
               </p:cTn>
               <p:prevCondLst>
@@ -29409,6 +30501,9 @@
         </p:cTn>
       </p:par>
     </p:tnLst>
+    <p:bldLst>
+      <p:bldP spid="6" grpId="0"/>
+    </p:bldLst>
   </p:timing>
 </p:sld>
 </file>
@@ -29547,6 +30642,281 @@
   <p:clrMapOvr>
     <a:masterClrMapping/>
   </p:clrMapOvr>
+  <p:timing>
+    <p:tnLst>
+      <p:par>
+        <p:cTn id="1" dur="indefinite" restart="never" nodeType="tmRoot">
+          <p:childTnLst>
+            <p:seq concurrent="1" nextAc="seek">
+              <p:cTn id="2" dur="indefinite" nodeType="mainSeq">
+                <p:childTnLst>
+                  <p:par>
+                    <p:cTn id="3" fill="hold">
+                      <p:stCondLst>
+                        <p:cond delay="indefinite"/>
+                      </p:stCondLst>
+                      <p:childTnLst>
+                        <p:par>
+                          <p:cTn id="4" fill="hold">
+                            <p:stCondLst>
+                              <p:cond delay="0"/>
+                            </p:stCondLst>
+                            <p:childTnLst>
+                              <p:par>
+                                <p:cTn id="5" presetID="1" presetClass="entr" presetSubtype="0" fill="hold" nodeType="clickEffect">
+                                  <p:stCondLst>
+                                    <p:cond delay="0"/>
+                                  </p:stCondLst>
+                                  <p:childTnLst>
+                                    <p:set>
+                                      <p:cBhvr>
+                                        <p:cTn id="6" dur="1" fill="hold">
+                                          <p:stCondLst>
+                                            <p:cond delay="0"/>
+                                          </p:stCondLst>
+                                        </p:cTn>
+                                        <p:tgtEl>
+                                          <p:spTgt spid="3">
+                                            <p:txEl>
+                                              <p:pRg st="0" end="0"/>
+                                            </p:txEl>
+                                          </p:spTgt>
+                                        </p:tgtEl>
+                                        <p:attrNameLst>
+                                          <p:attrName>style.visibility</p:attrName>
+                                        </p:attrNameLst>
+                                      </p:cBhvr>
+                                      <p:to>
+                                        <p:strVal val="visible"/>
+                                      </p:to>
+                                    </p:set>
+                                  </p:childTnLst>
+                                </p:cTn>
+                              </p:par>
+                            </p:childTnLst>
+                          </p:cTn>
+                        </p:par>
+                      </p:childTnLst>
+                    </p:cTn>
+                  </p:par>
+                  <p:par>
+                    <p:cTn id="7" fill="hold">
+                      <p:stCondLst>
+                        <p:cond delay="indefinite"/>
+                      </p:stCondLst>
+                      <p:childTnLst>
+                        <p:par>
+                          <p:cTn id="8" fill="hold">
+                            <p:stCondLst>
+                              <p:cond delay="0"/>
+                            </p:stCondLst>
+                            <p:childTnLst>
+                              <p:par>
+                                <p:cTn id="9" presetID="1" presetClass="entr" presetSubtype="0" fill="hold" nodeType="clickEffect">
+                                  <p:stCondLst>
+                                    <p:cond delay="0"/>
+                                  </p:stCondLst>
+                                  <p:childTnLst>
+                                    <p:set>
+                                      <p:cBhvr>
+                                        <p:cTn id="10" dur="1" fill="hold">
+                                          <p:stCondLst>
+                                            <p:cond delay="0"/>
+                                          </p:stCondLst>
+                                        </p:cTn>
+                                        <p:tgtEl>
+                                          <p:spTgt spid="3">
+                                            <p:txEl>
+                                              <p:pRg st="1" end="1"/>
+                                            </p:txEl>
+                                          </p:spTgt>
+                                        </p:tgtEl>
+                                        <p:attrNameLst>
+                                          <p:attrName>style.visibility</p:attrName>
+                                        </p:attrNameLst>
+                                      </p:cBhvr>
+                                      <p:to>
+                                        <p:strVal val="visible"/>
+                                      </p:to>
+                                    </p:set>
+                                  </p:childTnLst>
+                                </p:cTn>
+                              </p:par>
+                            </p:childTnLst>
+                          </p:cTn>
+                        </p:par>
+                      </p:childTnLst>
+                    </p:cTn>
+                  </p:par>
+                  <p:par>
+                    <p:cTn id="11" fill="hold">
+                      <p:stCondLst>
+                        <p:cond delay="indefinite"/>
+                      </p:stCondLst>
+                      <p:childTnLst>
+                        <p:par>
+                          <p:cTn id="12" fill="hold">
+                            <p:stCondLst>
+                              <p:cond delay="0"/>
+                            </p:stCondLst>
+                            <p:childTnLst>
+                              <p:par>
+                                <p:cTn id="13" presetID="1" presetClass="entr" presetSubtype="0" fill="hold" nodeType="clickEffect">
+                                  <p:stCondLst>
+                                    <p:cond delay="0"/>
+                                  </p:stCondLst>
+                                  <p:childTnLst>
+                                    <p:set>
+                                      <p:cBhvr>
+                                        <p:cTn id="14" dur="1" fill="hold">
+                                          <p:stCondLst>
+                                            <p:cond delay="0"/>
+                                          </p:stCondLst>
+                                        </p:cTn>
+                                        <p:tgtEl>
+                                          <p:spTgt spid="3">
+                                            <p:txEl>
+                                              <p:pRg st="2" end="2"/>
+                                            </p:txEl>
+                                          </p:spTgt>
+                                        </p:tgtEl>
+                                        <p:attrNameLst>
+                                          <p:attrName>style.visibility</p:attrName>
+                                        </p:attrNameLst>
+                                      </p:cBhvr>
+                                      <p:to>
+                                        <p:strVal val="visible"/>
+                                      </p:to>
+                                    </p:set>
+                                  </p:childTnLst>
+                                </p:cTn>
+                              </p:par>
+                            </p:childTnLst>
+                          </p:cTn>
+                        </p:par>
+                      </p:childTnLst>
+                    </p:cTn>
+                  </p:par>
+                  <p:par>
+                    <p:cTn id="15" fill="hold">
+                      <p:stCondLst>
+                        <p:cond delay="indefinite"/>
+                      </p:stCondLst>
+                      <p:childTnLst>
+                        <p:par>
+                          <p:cTn id="16" fill="hold">
+                            <p:stCondLst>
+                              <p:cond delay="0"/>
+                            </p:stCondLst>
+                            <p:childTnLst>
+                              <p:par>
+                                <p:cTn id="17" presetID="1" presetClass="entr" presetSubtype="0" fill="hold" nodeType="clickEffect">
+                                  <p:stCondLst>
+                                    <p:cond delay="0"/>
+                                  </p:stCondLst>
+                                  <p:childTnLst>
+                                    <p:set>
+                                      <p:cBhvr>
+                                        <p:cTn id="18" dur="1" fill="hold">
+                                          <p:stCondLst>
+                                            <p:cond delay="0"/>
+                                          </p:stCondLst>
+                                        </p:cTn>
+                                        <p:tgtEl>
+                                          <p:spTgt spid="3">
+                                            <p:txEl>
+                                              <p:pRg st="3" end="3"/>
+                                            </p:txEl>
+                                          </p:spTgt>
+                                        </p:tgtEl>
+                                        <p:attrNameLst>
+                                          <p:attrName>style.visibility</p:attrName>
+                                        </p:attrNameLst>
+                                      </p:cBhvr>
+                                      <p:to>
+                                        <p:strVal val="visible"/>
+                                      </p:to>
+                                    </p:set>
+                                  </p:childTnLst>
+                                </p:cTn>
+                              </p:par>
+                            </p:childTnLst>
+                          </p:cTn>
+                        </p:par>
+                      </p:childTnLst>
+                    </p:cTn>
+                  </p:par>
+                  <p:par>
+                    <p:cTn id="19" fill="hold">
+                      <p:stCondLst>
+                        <p:cond delay="indefinite"/>
+                      </p:stCondLst>
+                      <p:childTnLst>
+                        <p:par>
+                          <p:cTn id="20" fill="hold">
+                            <p:stCondLst>
+                              <p:cond delay="0"/>
+                            </p:stCondLst>
+                            <p:childTnLst>
+                              <p:par>
+                                <p:cTn id="21" presetID="1" presetClass="entr" presetSubtype="0" fill="hold" nodeType="clickEffect">
+                                  <p:stCondLst>
+                                    <p:cond delay="0"/>
+                                  </p:stCondLst>
+                                  <p:childTnLst>
+                                    <p:set>
+                                      <p:cBhvr>
+                                        <p:cTn id="22" dur="1" fill="hold">
+                                          <p:stCondLst>
+                                            <p:cond delay="0"/>
+                                          </p:stCondLst>
+                                        </p:cTn>
+                                        <p:tgtEl>
+                                          <p:spTgt spid="3">
+                                            <p:txEl>
+                                              <p:pRg st="4" end="4"/>
+                                            </p:txEl>
+                                          </p:spTgt>
+                                        </p:tgtEl>
+                                        <p:attrNameLst>
+                                          <p:attrName>style.visibility</p:attrName>
+                                        </p:attrNameLst>
+                                      </p:cBhvr>
+                                      <p:to>
+                                        <p:strVal val="visible"/>
+                                      </p:to>
+                                    </p:set>
+                                  </p:childTnLst>
+                                </p:cTn>
+                              </p:par>
+                            </p:childTnLst>
+                          </p:cTn>
+                        </p:par>
+                      </p:childTnLst>
+                    </p:cTn>
+                  </p:par>
+                </p:childTnLst>
+              </p:cTn>
+              <p:prevCondLst>
+                <p:cond evt="onPrev" delay="0">
+                  <p:tgtEl>
+                    <p:sldTgt/>
+                  </p:tgtEl>
+                </p:cond>
+              </p:prevCondLst>
+              <p:nextCondLst>
+                <p:cond evt="onNext" delay="0">
+                  <p:tgtEl>
+                    <p:sldTgt/>
+                  </p:tgtEl>
+                </p:cond>
+              </p:nextCondLst>
+            </p:seq>
+          </p:childTnLst>
+        </p:cTn>
+      </p:par>
+    </p:tnLst>
+  </p:timing>
 </p:sld>
 </file>
 
@@ -35221,18 +36591,18 @@
 </file>
 
 <file path=customXml/item1.xml><?xml version="1.0" encoding="utf-8"?>
+<p:properties xmlns:p="http://schemas.microsoft.com/office/2006/metadata/properties" xmlns:xsi="http://www.w3.org/2001/XMLSchema-instance" xmlns:pc="http://schemas.microsoft.com/office/infopath/2007/PartnerControls">
+  <documentManagement/>
+</p:properties>
+</file>
+
+<file path=customXml/item2.xml><?xml version="1.0" encoding="utf-8"?>
 <?mso-contentType ?>
 <FormTemplates xmlns="http://schemas.microsoft.com/sharepoint/v3/contenttype/forms">
   <Display>DocumentLibraryForm</Display>
   <Edit>DocumentLibraryForm</Edit>
   <New>DocumentLibraryForm</New>
 </FormTemplates>
-</file>
-
-<file path=customXml/item2.xml><?xml version="1.0" encoding="utf-8"?>
-<p:properties xmlns:p="http://schemas.microsoft.com/office/2006/metadata/properties" xmlns:xsi="http://www.w3.org/2001/XMLSchema-instance" xmlns:pc="http://schemas.microsoft.com/office/infopath/2007/PartnerControls">
-  <documentManagement/>
-</p:properties>
 </file>
 
 <file path=customXml/item3.xml><?xml version="1.0" encoding="utf-8"?>
@@ -35439,14 +36809,6 @@
 </file>
 
 <file path=customXml/itemProps1.xml><?xml version="1.0" encoding="utf-8"?>
-<ds:datastoreItem xmlns:ds="http://schemas.openxmlformats.org/officeDocument/2006/customXml" ds:itemID="{BBD45536-3B4D-457A-8F7D-528A6EEA8582}">
-  <ds:schemaRefs>
-    <ds:schemaRef ds:uri="http://schemas.microsoft.com/sharepoint/v3/contenttype/forms"/>
-  </ds:schemaRefs>
-</ds:datastoreItem>
-</file>
-
-<file path=customXml/itemProps2.xml><?xml version="1.0" encoding="utf-8"?>
 <ds:datastoreItem xmlns:ds="http://schemas.openxmlformats.org/officeDocument/2006/customXml" ds:itemID="{6048EABA-9281-4F86-AFFF-A569A488031B}">
   <ds:schemaRefs>
     <ds:schemaRef ds:uri="http://purl.org/dc/terms/"/>
@@ -35459,6 +36821,14 @@
     <ds:schemaRef ds:uri="6c550fb1-4284-40c0-9333-fba37d2dfebe"/>
     <ds:schemaRef ds:uri="http://www.w3.org/XML/1998/namespace"/>
     <ds:schemaRef ds:uri="http://purl.org/dc/dcmitype/"/>
+  </ds:schemaRefs>
+</ds:datastoreItem>
+</file>
+
+<file path=customXml/itemProps2.xml><?xml version="1.0" encoding="utf-8"?>
+<ds:datastoreItem xmlns:ds="http://schemas.openxmlformats.org/officeDocument/2006/customXml" ds:itemID="{BBD45536-3B4D-457A-8F7D-528A6EEA8582}">
+  <ds:schemaRefs>
+    <ds:schemaRef ds:uri="http://schemas.microsoft.com/sharepoint/v3/contenttype/forms"/>
   </ds:schemaRefs>
 </ds:datastoreItem>
 </file>

</xml_diff>